<commit_message>
finial verison of power point
</commit_message>
<xml_diff>
--- a/API (Application Programming Interface).pptx
+++ b/API (Application Programming Interface).pptx
@@ -23895,7 +23895,7 @@
         </p:nvSpPr>
         <p:spPr>
           <a:xfrm>
-            <a:off x="3735695" y="2483809"/>
+            <a:off x="2974332" y="2437364"/>
             <a:ext cx="9035972" cy="784830"/>
           </a:xfrm>
           <a:prstGeom prst="rect">
@@ -23916,6 +23916,7 @@
           </a:bodyPr>
           <a:lstStyle/>
           <a:p>
+            <a:pPr algn="ctr"/>
             <a:r>
               <a:rPr lang="en-US" sz="4500" dirty="0">
                 <a:solidFill>
@@ -23923,7 +23924,7 @@
                 </a:solidFill>
                 <a:latin typeface="Bernard MT Condensed" panose="02050806060905020404" pitchFamily="18" charset="77"/>
               </a:rPr>
-              <a:t>Application Programming Interface</a:t>
+              <a:t>Any Questions?</a:t>
             </a:r>
           </a:p>
         </p:txBody>
@@ -23942,8 +23943,8 @@
         </p:nvSpPr>
         <p:spPr>
           <a:xfrm>
-            <a:off x="5925233" y="1574409"/>
-            <a:ext cx="4861830" cy="1323439"/>
+            <a:off x="4448463" y="-14894"/>
+            <a:ext cx="6410037" cy="3785652"/>
           </a:xfrm>
           <a:prstGeom prst="rect">
             <a:avLst/>
@@ -23963,6 +23964,7 @@
           </a:bodyPr>
           <a:lstStyle/>
           <a:p>
+            <a:pPr algn="ctr"/>
             <a:r>
               <a:rPr lang="en-US" sz="8000" b="1" dirty="0">
                 <a:solidFill>
@@ -23972,9 +23974,12 @@
                 <a:ea typeface="Brush Script MT" panose="03060802040406070304" pitchFamily="66" charset="-122"/>
                 <a:cs typeface="Brush Script MT" panose="03060802040406070304" pitchFamily="66" charset="-122"/>
               </a:rPr>
-              <a:t>Works Cited</a:t>
+              <a:t>Works Cited Page</a:t>
             </a:r>
-            <a:endParaRPr lang="en-US" sz="3200" b="1" dirty="0">
+          </a:p>
+          <a:p>
+            <a:pPr algn="ctr"/>
+            <a:endParaRPr lang="en-US" sz="8000" b="1" dirty="0">
               <a:solidFill>
                 <a:srgbClr val="EBAB36"/>
               </a:solidFill>
@@ -23999,8 +24004,8 @@
         </p:nvSpPr>
         <p:spPr>
           <a:xfrm>
-            <a:off x="5043488" y="3729038"/>
-            <a:ext cx="5586412" cy="2338199"/>
+            <a:off x="4030703" y="3610422"/>
+            <a:ext cx="8250474" cy="2542363"/>
           </a:xfrm>
           <a:prstGeom prst="rect">
             <a:avLst/>
@@ -24013,7 +24018,215 @@
           </a:bodyPr>
           <a:lstStyle/>
           <a:p>
-            <a:endParaRPr lang="en-US" dirty="0"/>
+            <a:pPr marL="285750" indent="-285750">
+              <a:lnSpc>
+                <a:spcPct val="150000"/>
+              </a:lnSpc>
+              <a:buFont typeface="Wingdings" pitchFamily="2" charset="2"/>
+              <a:buChar char="v"/>
+            </a:pPr>
+            <a:r>
+              <a:rPr lang="en-US" dirty="0">
+                <a:solidFill>
+                  <a:schemeClr val="bg1"/>
+                </a:solidFill>
+              </a:rPr>
+              <a:t>Radhika. 7 API Examples We Use in Our Everyday Lives, Turing Enterprises Inc, 3 May 2022, </a:t>
+            </a:r>
+            <a:r>
+              <a:rPr lang="en-US" dirty="0" err="1">
+                <a:solidFill>
+                  <a:schemeClr val="bg1"/>
+                </a:solidFill>
+              </a:rPr>
+              <a:t>www.turing.com</a:t>
+            </a:r>
+            <a:r>
+              <a:rPr lang="en-US" dirty="0">
+                <a:solidFill>
+                  <a:schemeClr val="bg1"/>
+                </a:solidFill>
+              </a:rPr>
+              <a:t>/kb/7-examples-of-apis. </a:t>
+            </a:r>
+          </a:p>
+          <a:p>
+            <a:pPr marL="285750" indent="-285750">
+              <a:lnSpc>
+                <a:spcPct val="150000"/>
+              </a:lnSpc>
+              <a:buFont typeface="Wingdings" pitchFamily="2" charset="2"/>
+              <a:buChar char="v"/>
+            </a:pPr>
+            <a:r>
+              <a:rPr lang="en-US" dirty="0">
+                <a:solidFill>
+                  <a:schemeClr val="bg1"/>
+                </a:solidFill>
+              </a:rPr>
+              <a:t>“What Is an API? (Application Programming Interface).” MuleSoft, </a:t>
+            </a:r>
+            <a:r>
+              <a:rPr lang="en-US" dirty="0" err="1">
+                <a:solidFill>
+                  <a:schemeClr val="bg1"/>
+                </a:solidFill>
+              </a:rPr>
+              <a:t>www.mulesoft.com</a:t>
+            </a:r>
+            <a:r>
+              <a:rPr lang="en-US" dirty="0">
+                <a:solidFill>
+                  <a:schemeClr val="bg1"/>
+                </a:solidFill>
+              </a:rPr>
+              <a:t>/resources/</a:t>
+            </a:r>
+            <a:r>
+              <a:rPr lang="en-US" dirty="0" err="1">
+                <a:solidFill>
+                  <a:schemeClr val="bg1"/>
+                </a:solidFill>
+              </a:rPr>
+              <a:t>api</a:t>
+            </a:r>
+            <a:r>
+              <a:rPr lang="en-US" dirty="0">
+                <a:solidFill>
+                  <a:schemeClr val="bg1"/>
+                </a:solidFill>
+              </a:rPr>
+              <a:t>/what-is-an-</a:t>
+            </a:r>
+            <a:r>
+              <a:rPr lang="en-US" dirty="0" err="1">
+                <a:solidFill>
+                  <a:schemeClr val="bg1"/>
+                </a:solidFill>
+              </a:rPr>
+              <a:t>api</a:t>
+            </a:r>
+            <a:r>
+              <a:rPr lang="en-US" dirty="0">
+                <a:solidFill>
+                  <a:schemeClr val="bg1"/>
+                </a:solidFill>
+              </a:rPr>
+              <a:t>. Accessed 18 Apr. 2024. </a:t>
+            </a:r>
+          </a:p>
+          <a:p>
+            <a:pPr marL="285750" indent="-285750">
+              <a:lnSpc>
+                <a:spcPct val="150000"/>
+              </a:lnSpc>
+              <a:buFont typeface="Wingdings" pitchFamily="2" charset="2"/>
+              <a:buChar char="v"/>
+            </a:pPr>
+            <a:r>
+              <a:rPr lang="en-US" dirty="0">
+                <a:solidFill>
+                  <a:schemeClr val="bg1"/>
+                </a:solidFill>
+              </a:rPr>
+              <a:t>“What Is an API? How </a:t>
+            </a:r>
+            <a:r>
+              <a:rPr lang="en-US" dirty="0" err="1">
+                <a:solidFill>
+                  <a:schemeClr val="bg1"/>
+                </a:solidFill>
+              </a:rPr>
+              <a:t>Apis</a:t>
+            </a:r>
+            <a:r>
+              <a:rPr lang="en-US" dirty="0">
+                <a:solidFill>
+                  <a:schemeClr val="bg1"/>
+                </a:solidFill>
+              </a:rPr>
+              <a:t> Work, Simply Explained.” </a:t>
+            </a:r>
+            <a:r>
+              <a:rPr lang="en-US" dirty="0" err="1">
+                <a:solidFill>
+                  <a:schemeClr val="bg1"/>
+                </a:solidFill>
+              </a:rPr>
+              <a:t>Contentful</a:t>
+            </a:r>
+            <a:r>
+              <a:rPr lang="en-US" dirty="0">
+                <a:solidFill>
+                  <a:schemeClr val="bg1"/>
+                </a:solidFill>
+              </a:rPr>
+              <a:t>, </a:t>
+            </a:r>
+            <a:r>
+              <a:rPr lang="en-US" dirty="0" err="1">
+                <a:solidFill>
+                  <a:schemeClr val="bg1"/>
+                </a:solidFill>
+              </a:rPr>
+              <a:t>Contentful</a:t>
+            </a:r>
+            <a:r>
+              <a:rPr lang="en-US" dirty="0">
+                <a:solidFill>
+                  <a:schemeClr val="bg1"/>
+                </a:solidFill>
+              </a:rPr>
+              <a:t>, GmbH, </a:t>
+            </a:r>
+            <a:r>
+              <a:rPr lang="en-US" dirty="0" err="1">
+                <a:solidFill>
+                  <a:schemeClr val="bg1"/>
+                </a:solidFill>
+              </a:rPr>
+              <a:t>www.contentful.com</a:t>
+            </a:r>
+            <a:r>
+              <a:rPr lang="en-US" dirty="0">
+                <a:solidFill>
+                  <a:schemeClr val="bg1"/>
+                </a:solidFill>
+              </a:rPr>
+              <a:t>/</a:t>
+            </a:r>
+            <a:r>
+              <a:rPr lang="en-US" dirty="0" err="1">
+                <a:solidFill>
+                  <a:schemeClr val="bg1"/>
+                </a:solidFill>
+              </a:rPr>
+              <a:t>api</a:t>
+            </a:r>
+            <a:r>
+              <a:rPr lang="en-US" dirty="0">
+                <a:solidFill>
+                  <a:schemeClr val="bg1"/>
+                </a:solidFill>
+              </a:rPr>
+              <a:t>/#types-of-</a:t>
+            </a:r>
+            <a:r>
+              <a:rPr lang="en-US" dirty="0" err="1">
+                <a:solidFill>
+                  <a:schemeClr val="bg1"/>
+                </a:solidFill>
+              </a:rPr>
+              <a:t>apis</a:t>
+            </a:r>
+            <a:r>
+              <a:rPr lang="en-US" dirty="0">
+                <a:solidFill>
+                  <a:schemeClr val="bg1"/>
+                </a:solidFill>
+              </a:rPr>
+              <a:t>. Accessed 18 Apr. 2024. </a:t>
+            </a:r>
           </a:p>
         </p:txBody>
       </p:sp>

</xml_diff>